<commit_message>
v1 of PM10 template
v1 of PM10 template without PM2.5/PM10 ratio
</commit_message>
<xml_diff>
--- a/sensortoolkit/evaluation_objs/templates/PM10/Reporting_Template_Base_PM10.pptx
+++ b/sensortoolkit/evaluation_objs/templates/PM10/Reporting_Template_Base_PM10.pptx
@@ -2879,6 +2879,38 @@
       </pc:sldChg>
     </pc:docChg>
   </pc:docChgLst>
+  <pc:docChgLst>
+    <pc:chgData name="Kumar, Menaka" userId="8972b6a7-3ec9-4ac8-b4ad-4e01d2fc2916" providerId="ADAL" clId="{3A59A504-4BBF-4CE1-B725-22C02D41D3A9}"/>
+    <pc:docChg chg="modSld">
+      <pc:chgData name="Kumar, Menaka" userId="8972b6a7-3ec9-4ac8-b4ad-4e01d2fc2916" providerId="ADAL" clId="{3A59A504-4BBF-4CE1-B725-22C02D41D3A9}" dt="2024-05-30T18:54:23.963" v="5" actId="20577"/>
+      <pc:docMkLst>
+        <pc:docMk/>
+      </pc:docMkLst>
+      <pc:sldChg chg="modSp mod">
+        <pc:chgData name="Kumar, Menaka" userId="8972b6a7-3ec9-4ac8-b4ad-4e01d2fc2916" providerId="ADAL" clId="{3A59A504-4BBF-4CE1-B725-22C02D41D3A9}" dt="2024-05-30T18:54:23.963" v="5" actId="20577"/>
+        <pc:sldMkLst>
+          <pc:docMk/>
+          <pc:sldMk cId="1609848839" sldId="256"/>
+        </pc:sldMkLst>
+        <pc:graphicFrameChg chg="mod">
+          <ac:chgData name="Kumar, Menaka" userId="8972b6a7-3ec9-4ac8-b4ad-4e01d2fc2916" providerId="ADAL" clId="{3A59A504-4BBF-4CE1-B725-22C02D41D3A9}" dt="2024-05-30T18:54:13.006" v="1"/>
+          <ac:graphicFrameMkLst>
+            <pc:docMk/>
+            <pc:sldMk cId="1609848839" sldId="256"/>
+            <ac:graphicFrameMk id="32" creationId="{0D1D374C-B4C8-4DAE-87EF-F02EFE4AFFB7}"/>
+          </ac:graphicFrameMkLst>
+        </pc:graphicFrameChg>
+        <pc:graphicFrameChg chg="modGraphic">
+          <ac:chgData name="Kumar, Menaka" userId="8972b6a7-3ec9-4ac8-b4ad-4e01d2fc2916" providerId="ADAL" clId="{3A59A504-4BBF-4CE1-B725-22C02D41D3A9}" dt="2024-05-30T18:54:23.963" v="5" actId="20577"/>
+          <ac:graphicFrameMkLst>
+            <pc:docMk/>
+            <pc:sldMk cId="1609848839" sldId="256"/>
+            <ac:graphicFrameMk id="75" creationId="{6EB4E630-8A33-412B-A3BF-8934090A792B}"/>
+          </ac:graphicFrameMkLst>
+        </pc:graphicFrameChg>
+      </pc:sldChg>
+    </pc:docChg>
+  </pc:docChgLst>
 </pc:chgInfo>
 </file>
 
@@ -2976,7 +3008,7 @@
           <a:p>
             <a:fld id="{3086CAC7-D409-43E0-9239-3260F031D6D3}" type="datetimeFigureOut">
               <a:rPr lang="en-US" smtClean="0"/>
-              <a:t>2/8/2023</a:t>
+              <a:t>5/30/2024</a:t>
             </a:fld>
             <a:endParaRPr lang="en-US"/>
           </a:p>
@@ -3153,7 +3185,7 @@
           <a:p>
             <a:fld id="{3CA1DE52-DF04-4D3A-9C2F-16E440759AD9}" type="datetimeFigureOut">
               <a:rPr lang="en-US" smtClean="0"/>
-              <a:t>2/8/2023</a:t>
+              <a:t>5/30/2024</a:t>
             </a:fld>
             <a:endParaRPr lang="en-US"/>
           </a:p>
@@ -4498,7 +4530,7 @@
           <p:nvPr>
             <p:extLst>
               <p:ext uri="{D42A27DB-BD31-4B8C-83A1-F6EECF244321}">
-                <p14:modId xmlns:p14="http://schemas.microsoft.com/office/powerpoint/2010/main" val="1023492629"/>
+                <p14:modId xmlns:p14="http://schemas.microsoft.com/office/powerpoint/2010/main" val="3411218623"/>
               </p:ext>
             </p:extLst>
           </p:nvPr>
@@ -4542,7 +4574,7 @@
                             <a:sysClr val="windowText" lastClr="000000"/>
                           </a:solidFill>
                         </a:rPr>
-                        <a:t>Mean number of paired, normalized concentration and temperature values (1-hr averages)</a:t>
+                        <a:t>Number of paired, normalized concentration and temperature values</a:t>
                       </a:r>
                     </a:p>
                   </a:txBody>
@@ -4695,7 +4727,7 @@
                             <a:sysClr val="windowText" lastClr="000000"/>
                           </a:solidFill>
                         </a:rPr>
-                        <a:t>Mean number of paired, normalized concentration and relative humidity values (1-hr averages)</a:t>
+                        <a:t>Mean number of paired, normalized concentration and relative humidity values</a:t>
                       </a:r>
                     </a:p>
                   </a:txBody>
@@ -8101,7 +8133,7 @@
           <p:nvPr>
             <p:extLst>
               <p:ext uri="{D42A27DB-BD31-4B8C-83A1-F6EECF244321}">
-                <p14:modId xmlns:p14="http://schemas.microsoft.com/office/powerpoint/2010/main" val="2530439557"/>
+                <p14:modId xmlns:p14="http://schemas.microsoft.com/office/powerpoint/2010/main" val="3374240126"/>
               </p:ext>
             </p:extLst>
           </p:nvPr>
@@ -8330,7 +8362,15 @@
                             <a:sysClr val="windowText" lastClr="000000"/>
                           </a:solidFill>
                         </a:rPr>
-                        <a:t>Number of 24-hr periods in FRM/FEM monitor measurements with a goal concentration ≥ 25 </a:t>
+                        <a:t>Number of 24-hr periods in FRM/FEM monitor measurements with a goal concentration </a:t>
+                      </a:r>
+                      <a:r>
+                        <a:rPr lang="en-US" sz="1100" b="0">
+                          <a:solidFill>
+                            <a:sysClr val="windowText" lastClr="000000"/>
+                          </a:solidFill>
+                        </a:rPr>
+                        <a:t>≥ 40 </a:t>
                       </a:r>
                       <a:r>
                         <a:rPr lang="el-GR" sz="1100" b="0" dirty="0">
@@ -14691,42 +14731,8 @@
 </file>
 
 <file path=customXml/item1.xml><?xml version="1.0" encoding="utf-8"?>
-<p:properties xmlns:p="http://schemas.microsoft.com/office/2006/metadata/properties" xmlns:xsi="http://www.w3.org/2001/XMLSchema-instance" xmlns:pc="http://schemas.microsoft.com/office/infopath/2007/PartnerControls">
-  <documentManagement>
-    <_Source xmlns="http://schemas.microsoft.com/sharepoint/v3/fields" xsi:nil="true"/>
-    <Language xmlns="http://schemas.microsoft.com/sharepoint/v3">English</Language>
-    <j747ac98061d40f0aa7bd47e1db5675d xmlns="4ffa91fb-a0ff-4ac5-b2db-65c790d184a4">
-      <Terms xmlns="http://schemas.microsoft.com/office/infopath/2007/PartnerControls"/>
-    </j747ac98061d40f0aa7bd47e1db5675d>
-    <External_x0020_Contributor xmlns="4ffa91fb-a0ff-4ac5-b2db-65c790d184a4" xsi:nil="true"/>
-    <TaxKeywordTaxHTField xmlns="4ffa91fb-a0ff-4ac5-b2db-65c790d184a4">
-      <Terms xmlns="http://schemas.microsoft.com/office/infopath/2007/PartnerControls"/>
-    </TaxKeywordTaxHTField>
-    <Record xmlns="4ffa91fb-a0ff-4ac5-b2db-65c790d184a4">Shared</Record>
-    <Rights xmlns="4ffa91fb-a0ff-4ac5-b2db-65c790d184a4" xsi:nil="true"/>
-    <Document_x0020_Creation_x0020_Date xmlns="4ffa91fb-a0ff-4ac5-b2db-65c790d184a4">2020-03-04T16:29:16+00:00</Document_x0020_Creation_x0020_Date>
-    <EPA_x0020_Office xmlns="4ffa91fb-a0ff-4ac5-b2db-65c790d184a4" xsi:nil="true"/>
-    <CategoryDescription xmlns="http://schemas.microsoft.com/sharepoint.v3" xsi:nil="true"/>
-    <Identifier xmlns="4ffa91fb-a0ff-4ac5-b2db-65c790d184a4" xsi:nil="true"/>
-    <_Coverage xmlns="http://schemas.microsoft.com/sharepoint/v3/fields" xsi:nil="true"/>
-    <Creator xmlns="4ffa91fb-a0ff-4ac5-b2db-65c790d184a4">
-      <UserInfo>
-        <DisplayName/>
-        <AccountId xsi:nil="true"/>
-        <AccountType/>
-      </UserInfo>
-    </Creator>
-    <EPA_x0020_Related_x0020_Documents xmlns="4ffa91fb-a0ff-4ac5-b2db-65c790d184a4" xsi:nil="true"/>
-    <EPA_x0020_Contributor xmlns="4ffa91fb-a0ff-4ac5-b2db-65c790d184a4">
-      <UserInfo>
-        <DisplayName/>
-        <AccountId xsi:nil="true"/>
-        <AccountType/>
-      </UserInfo>
-    </EPA_x0020_Contributor>
-    <TaxCatchAll xmlns="4ffa91fb-a0ff-4ac5-b2db-65c790d184a4"/>
-  </documentManagement>
-</p:properties>
+<?mso-contentType ?>
+<SharedContentType xmlns="Microsoft.SharePoint.Taxonomy.ContentTypeSync" SourceId="29f62856-1543-49d4-a736-4569d363f533" ContentTypeId="0x0101" PreviousValue="false"/>
 </file>
 
 <file path=customXml/item2.xml><?xml version="1.0" encoding="utf-8"?>
@@ -15128,8 +15134,42 @@
 </file>
 
 <file path=customXml/item3.xml><?xml version="1.0" encoding="utf-8"?>
-<?mso-contentType ?>
-<SharedContentType xmlns="Microsoft.SharePoint.Taxonomy.ContentTypeSync" SourceId="29f62856-1543-49d4-a736-4569d363f533" ContentTypeId="0x0101" PreviousValue="false"/>
+<p:properties xmlns:p="http://schemas.microsoft.com/office/2006/metadata/properties" xmlns:xsi="http://www.w3.org/2001/XMLSchema-instance" xmlns:pc="http://schemas.microsoft.com/office/infopath/2007/PartnerControls">
+  <documentManagement>
+    <_Source xmlns="http://schemas.microsoft.com/sharepoint/v3/fields" xsi:nil="true"/>
+    <Language xmlns="http://schemas.microsoft.com/sharepoint/v3">English</Language>
+    <j747ac98061d40f0aa7bd47e1db5675d xmlns="4ffa91fb-a0ff-4ac5-b2db-65c790d184a4">
+      <Terms xmlns="http://schemas.microsoft.com/office/infopath/2007/PartnerControls"/>
+    </j747ac98061d40f0aa7bd47e1db5675d>
+    <External_x0020_Contributor xmlns="4ffa91fb-a0ff-4ac5-b2db-65c790d184a4" xsi:nil="true"/>
+    <TaxKeywordTaxHTField xmlns="4ffa91fb-a0ff-4ac5-b2db-65c790d184a4">
+      <Terms xmlns="http://schemas.microsoft.com/office/infopath/2007/PartnerControls"/>
+    </TaxKeywordTaxHTField>
+    <Record xmlns="4ffa91fb-a0ff-4ac5-b2db-65c790d184a4">Shared</Record>
+    <Rights xmlns="4ffa91fb-a0ff-4ac5-b2db-65c790d184a4" xsi:nil="true"/>
+    <Document_x0020_Creation_x0020_Date xmlns="4ffa91fb-a0ff-4ac5-b2db-65c790d184a4">2020-03-04T16:29:16+00:00</Document_x0020_Creation_x0020_Date>
+    <EPA_x0020_Office xmlns="4ffa91fb-a0ff-4ac5-b2db-65c790d184a4" xsi:nil="true"/>
+    <CategoryDescription xmlns="http://schemas.microsoft.com/sharepoint.v3" xsi:nil="true"/>
+    <Identifier xmlns="4ffa91fb-a0ff-4ac5-b2db-65c790d184a4" xsi:nil="true"/>
+    <_Coverage xmlns="http://schemas.microsoft.com/sharepoint/v3/fields" xsi:nil="true"/>
+    <Creator xmlns="4ffa91fb-a0ff-4ac5-b2db-65c790d184a4">
+      <UserInfo>
+        <DisplayName/>
+        <AccountId xsi:nil="true"/>
+        <AccountType/>
+      </UserInfo>
+    </Creator>
+    <EPA_x0020_Related_x0020_Documents xmlns="4ffa91fb-a0ff-4ac5-b2db-65c790d184a4" xsi:nil="true"/>
+    <EPA_x0020_Contributor xmlns="4ffa91fb-a0ff-4ac5-b2db-65c790d184a4">
+      <UserInfo>
+        <DisplayName/>
+        <AccountId xsi:nil="true"/>
+        <AccountType/>
+      </UserInfo>
+    </EPA_x0020_Contributor>
+    <TaxCatchAll xmlns="4ffa91fb-a0ff-4ac5-b2db-65c790d184a4"/>
+  </documentManagement>
+</p:properties>
 </file>
 
 <file path=customXml/item4.xml><?xml version="1.0" encoding="utf-8"?>
@@ -15142,14 +15182,9 @@
 </file>
 
 <file path=customXml/itemProps1.xml><?xml version="1.0" encoding="utf-8"?>
-<ds:datastoreItem xmlns:ds="http://schemas.openxmlformats.org/officeDocument/2006/customXml" ds:itemID="{2EED311A-CCB5-4625-B52F-BB9F85A51581}">
+<ds:datastoreItem xmlns:ds="http://schemas.openxmlformats.org/officeDocument/2006/customXml" ds:itemID="{9D969709-82DA-4F6F-85CB-B966EACA0A33}">
   <ds:schemaRefs>
-    <ds:schemaRef ds:uri="http://schemas.microsoft.com/office/2006/metadata/properties"/>
-    <ds:schemaRef ds:uri="http://schemas.microsoft.com/office/infopath/2007/PartnerControls"/>
-    <ds:schemaRef ds:uri="http://schemas.microsoft.com/sharepoint/v3/fields"/>
-    <ds:schemaRef ds:uri="http://schemas.microsoft.com/sharepoint/v3"/>
-    <ds:schemaRef ds:uri="4ffa91fb-a0ff-4ac5-b2db-65c790d184a4"/>
-    <ds:schemaRef ds:uri="http://schemas.microsoft.com/sharepoint.v3"/>
+    <ds:schemaRef ds:uri="Microsoft.SharePoint.Taxonomy.ContentTypeSync"/>
   </ds:schemaRefs>
 </ds:datastoreItem>
 </file>
@@ -15177,9 +15212,14 @@
 </file>
 
 <file path=customXml/itemProps3.xml><?xml version="1.0" encoding="utf-8"?>
-<ds:datastoreItem xmlns:ds="http://schemas.openxmlformats.org/officeDocument/2006/customXml" ds:itemID="{9D969709-82DA-4F6F-85CB-B966EACA0A33}">
+<ds:datastoreItem xmlns:ds="http://schemas.openxmlformats.org/officeDocument/2006/customXml" ds:itemID="{2EED311A-CCB5-4625-B52F-BB9F85A51581}">
   <ds:schemaRefs>
-    <ds:schemaRef ds:uri="Microsoft.SharePoint.Taxonomy.ContentTypeSync"/>
+    <ds:schemaRef ds:uri="http://schemas.microsoft.com/office/2006/metadata/properties"/>
+    <ds:schemaRef ds:uri="http://schemas.microsoft.com/office/infopath/2007/PartnerControls"/>
+    <ds:schemaRef ds:uri="http://schemas.microsoft.com/sharepoint/v3/fields"/>
+    <ds:schemaRef ds:uri="http://schemas.microsoft.com/sharepoint/v3"/>
+    <ds:schemaRef ds:uri="4ffa91fb-a0ff-4ac5-b2db-65c790d184a4"/>
+    <ds:schemaRef ds:uri="http://schemas.microsoft.com/sharepoint.v3"/>
   </ds:schemaRefs>
 </ds:datastoreItem>
 </file>

</xml_diff>